<commit_message>
# Updated Reunion informal 2013-09-23 .pptx
</commit_message>
<xml_diff>
--- a/docs/Reuniones/Sprint 2/Reunion Informal 2013-09-23/Reunion informal 2013-09-23 .pptx
+++ b/docs/Reuniones/Sprint 2/Reunion Informal 2013-09-23/Reunion informal 2013-09-23 .pptx
@@ -4,6 +4,9 @@
   <p:sldMasterIdLst>
     <p:sldMasterId id="2147483696" r:id="rId1"/>
   </p:sldMasterIdLst>
+  <p:notesMasterIdLst>
+    <p:notesMasterId r:id="rId19"/>
+  </p:notesMasterIdLst>
   <p:sldIdLst>
     <p:sldId id="256" r:id="rId2"/>
     <p:sldId id="257" r:id="rId3"/>
@@ -20,6 +23,8 @@
     <p:sldId id="263" r:id="rId14"/>
     <p:sldId id="293" r:id="rId15"/>
     <p:sldId id="295" r:id="rId16"/>
+    <p:sldId id="297" r:id="rId17"/>
+    <p:sldId id="298" r:id="rId18"/>
   </p:sldIdLst>
   <p:sldSz cx="9144000" cy="6858000" type="screen4x3"/>
   <p:notesSz cx="6858000" cy="9144000"/>
@@ -120,7 +125,7 @@
   </p:defaultTextStyle>
   <p:extLst>
     <p:ext uri="{EFAFB233-063F-42B5-8137-9DF3F51BA10A}">
-      <p15:sldGuideLst xmlns:p15="http://schemas.microsoft.com/office/powerpoint/2012/main" xmlns="">
+      <p15:sldGuideLst xmlns:p15="http://schemas.microsoft.com/office/powerpoint/2012/main">
         <p15:guide id="1" orient="horz" pos="2160">
           <p15:clr>
             <a:srgbClr val="A4A3A4"/>
@@ -135,6 +140,440 @@
     </p:ext>
   </p:extLst>
 </p:presentation>
+</file>
+
+<file path=ppt/notesMasters/notesMaster1.xml><?xml version="1.0" encoding="utf-8"?>
+<p:notesMaster xmlns:a="http://schemas.openxmlformats.org/drawingml/2006/main" xmlns:r="http://schemas.openxmlformats.org/officeDocument/2006/relationships" xmlns:p="http://schemas.openxmlformats.org/presentationml/2006/main">
+  <p:cSld>
+    <p:bg>
+      <p:bgRef idx="1001">
+        <a:schemeClr val="bg1"/>
+      </p:bgRef>
+    </p:bg>
+    <p:spTree>
+      <p:nvGrpSpPr>
+        <p:cNvPr id="1" name=""/>
+        <p:cNvGrpSpPr/>
+        <p:nvPr/>
+      </p:nvGrpSpPr>
+      <p:grpSpPr>
+        <a:xfrm>
+          <a:off x="0" y="0"/>
+          <a:ext cx="0" cy="0"/>
+          <a:chOff x="0" y="0"/>
+          <a:chExt cx="0" cy="0"/>
+        </a:xfrm>
+      </p:grpSpPr>
+      <p:sp>
+        <p:nvSpPr>
+          <p:cNvPr id="2" name="Header Placeholder 1"/>
+          <p:cNvSpPr>
+            <a:spLocks noGrp="1"/>
+          </p:cNvSpPr>
+          <p:nvPr>
+            <p:ph type="hdr" sz="quarter"/>
+          </p:nvPr>
+        </p:nvSpPr>
+        <p:spPr>
+          <a:xfrm>
+            <a:off x="0" y="0"/>
+            <a:ext cx="2971800" cy="458788"/>
+          </a:xfrm>
+          <a:prstGeom prst="rect">
+            <a:avLst/>
+          </a:prstGeom>
+        </p:spPr>
+        <p:txBody>
+          <a:bodyPr vert="horz" lIns="91440" tIns="45720" rIns="91440" bIns="45720" rtlCol="0"/>
+          <a:lstStyle>
+            <a:lvl1pPr algn="l">
+              <a:defRPr sz="1200"/>
+            </a:lvl1pPr>
+          </a:lstStyle>
+          <a:p>
+            <a:endParaRPr lang="es-AR"/>
+          </a:p>
+        </p:txBody>
+      </p:sp>
+      <p:sp>
+        <p:nvSpPr>
+          <p:cNvPr id="3" name="Date Placeholder 2"/>
+          <p:cNvSpPr>
+            <a:spLocks noGrp="1"/>
+          </p:cNvSpPr>
+          <p:nvPr>
+            <p:ph type="dt" idx="1"/>
+          </p:nvPr>
+        </p:nvSpPr>
+        <p:spPr>
+          <a:xfrm>
+            <a:off x="3884613" y="0"/>
+            <a:ext cx="2971800" cy="458788"/>
+          </a:xfrm>
+          <a:prstGeom prst="rect">
+            <a:avLst/>
+          </a:prstGeom>
+        </p:spPr>
+        <p:txBody>
+          <a:bodyPr vert="horz" lIns="91440" tIns="45720" rIns="91440" bIns="45720" rtlCol="0"/>
+          <a:lstStyle>
+            <a:lvl1pPr algn="r">
+              <a:defRPr sz="1200"/>
+            </a:lvl1pPr>
+          </a:lstStyle>
+          <a:p>
+            <a:fld id="{9ACE165A-4087-49F6-8818-6C7A6BA6DE10}" type="datetimeFigureOut">
+              <a:rPr lang="es-AR" smtClean="0"/>
+              <a:t>23/09/2013</a:t>
+            </a:fld>
+            <a:endParaRPr lang="es-AR"/>
+          </a:p>
+        </p:txBody>
+      </p:sp>
+      <p:sp>
+        <p:nvSpPr>
+          <p:cNvPr id="4" name="Slide Image Placeholder 3"/>
+          <p:cNvSpPr>
+            <a:spLocks noGrp="1" noRot="1" noChangeAspect="1"/>
+          </p:cNvSpPr>
+          <p:nvPr>
+            <p:ph type="sldImg" idx="2"/>
+          </p:nvPr>
+        </p:nvSpPr>
+        <p:spPr>
+          <a:xfrm>
+            <a:off x="1371600" y="1143000"/>
+            <a:ext cx="4114800" cy="3086100"/>
+          </a:xfrm>
+          <a:prstGeom prst="rect">
+            <a:avLst/>
+          </a:prstGeom>
+          <a:noFill/>
+          <a:ln w="12700">
+            <a:solidFill>
+              <a:prstClr val="black"/>
+            </a:solidFill>
+          </a:ln>
+        </p:spPr>
+        <p:txBody>
+          <a:bodyPr vert="horz" lIns="91440" tIns="45720" rIns="91440" bIns="45720" rtlCol="0" anchor="ctr"/>
+          <a:lstStyle/>
+          <a:p>
+            <a:endParaRPr lang="es-AR"/>
+          </a:p>
+        </p:txBody>
+      </p:sp>
+      <p:sp>
+        <p:nvSpPr>
+          <p:cNvPr id="5" name="Notes Placeholder 4"/>
+          <p:cNvSpPr>
+            <a:spLocks noGrp="1"/>
+          </p:cNvSpPr>
+          <p:nvPr>
+            <p:ph type="body" sz="quarter" idx="3"/>
+          </p:nvPr>
+        </p:nvSpPr>
+        <p:spPr>
+          <a:xfrm>
+            <a:off x="685800" y="4400550"/>
+            <a:ext cx="5486400" cy="3600450"/>
+          </a:xfrm>
+          <a:prstGeom prst="rect">
+            <a:avLst/>
+          </a:prstGeom>
+        </p:spPr>
+        <p:txBody>
+          <a:bodyPr vert="horz" lIns="91440" tIns="45720" rIns="91440" bIns="45720" rtlCol="0"/>
+          <a:lstStyle/>
+          <a:p>
+            <a:pPr lvl="0"/>
+            <a:r>
+              <a:rPr lang="en-US" smtClean="0"/>
+              <a:t>Click to edit Master text styles</a:t>
+            </a:r>
+          </a:p>
+          <a:p>
+            <a:pPr lvl="1"/>
+            <a:r>
+              <a:rPr lang="en-US" smtClean="0"/>
+              <a:t>Second level</a:t>
+            </a:r>
+          </a:p>
+          <a:p>
+            <a:pPr lvl="2"/>
+            <a:r>
+              <a:rPr lang="en-US" smtClean="0"/>
+              <a:t>Third level</a:t>
+            </a:r>
+          </a:p>
+          <a:p>
+            <a:pPr lvl="3"/>
+            <a:r>
+              <a:rPr lang="en-US" smtClean="0"/>
+              <a:t>Fourth level</a:t>
+            </a:r>
+          </a:p>
+          <a:p>
+            <a:pPr lvl="4"/>
+            <a:r>
+              <a:rPr lang="en-US" smtClean="0"/>
+              <a:t>Fifth level</a:t>
+            </a:r>
+            <a:endParaRPr lang="es-AR"/>
+          </a:p>
+        </p:txBody>
+      </p:sp>
+      <p:sp>
+        <p:nvSpPr>
+          <p:cNvPr id="6" name="Footer Placeholder 5"/>
+          <p:cNvSpPr>
+            <a:spLocks noGrp="1"/>
+          </p:cNvSpPr>
+          <p:nvPr>
+            <p:ph type="ftr" sz="quarter" idx="4"/>
+          </p:nvPr>
+        </p:nvSpPr>
+        <p:spPr>
+          <a:xfrm>
+            <a:off x="0" y="8685213"/>
+            <a:ext cx="2971800" cy="458787"/>
+          </a:xfrm>
+          <a:prstGeom prst="rect">
+            <a:avLst/>
+          </a:prstGeom>
+        </p:spPr>
+        <p:txBody>
+          <a:bodyPr vert="horz" lIns="91440" tIns="45720" rIns="91440" bIns="45720" rtlCol="0" anchor="b"/>
+          <a:lstStyle>
+            <a:lvl1pPr algn="l">
+              <a:defRPr sz="1200"/>
+            </a:lvl1pPr>
+          </a:lstStyle>
+          <a:p>
+            <a:endParaRPr lang="es-AR"/>
+          </a:p>
+        </p:txBody>
+      </p:sp>
+      <p:sp>
+        <p:nvSpPr>
+          <p:cNvPr id="7" name="Slide Number Placeholder 6"/>
+          <p:cNvSpPr>
+            <a:spLocks noGrp="1"/>
+          </p:cNvSpPr>
+          <p:nvPr>
+            <p:ph type="sldNum" sz="quarter" idx="5"/>
+          </p:nvPr>
+        </p:nvSpPr>
+        <p:spPr>
+          <a:xfrm>
+            <a:off x="3884613" y="8685213"/>
+            <a:ext cx="2971800" cy="458787"/>
+          </a:xfrm>
+          <a:prstGeom prst="rect">
+            <a:avLst/>
+          </a:prstGeom>
+        </p:spPr>
+        <p:txBody>
+          <a:bodyPr vert="horz" lIns="91440" tIns="45720" rIns="91440" bIns="45720" rtlCol="0" anchor="b"/>
+          <a:lstStyle>
+            <a:lvl1pPr algn="r">
+              <a:defRPr sz="1200"/>
+            </a:lvl1pPr>
+          </a:lstStyle>
+          <a:p>
+            <a:fld id="{DAB44264-54AC-4658-AFE4-D5385AA3C409}" type="slidenum">
+              <a:rPr lang="es-AR" smtClean="0"/>
+              <a:t>‹#›</a:t>
+            </a:fld>
+            <a:endParaRPr lang="es-AR"/>
+          </a:p>
+        </p:txBody>
+      </p:sp>
+    </p:spTree>
+    <p:extLst>
+      <p:ext uri="{BB962C8B-B14F-4D97-AF65-F5344CB8AC3E}">
+        <p14:creationId xmlns:p14="http://schemas.microsoft.com/office/powerpoint/2010/main" val="854811316"/>
+      </p:ext>
+    </p:extLst>
+  </p:cSld>
+  <p:clrMap bg1="lt1" tx1="dk1" bg2="lt2" tx2="dk2" accent1="accent1" accent2="accent2" accent3="accent3" accent4="accent4" accent5="accent5" accent6="accent6" hlink="hlink" folHlink="folHlink"/>
+  <p:notesStyle>
+    <a:lvl1pPr marL="0" algn="l" defTabSz="914400" rtl="0" eaLnBrk="1" latinLnBrk="0" hangingPunct="1">
+      <a:defRPr sz="1200" kern="1200">
+        <a:solidFill>
+          <a:schemeClr val="tx1"/>
+        </a:solidFill>
+        <a:latin typeface="+mn-lt"/>
+        <a:ea typeface="+mn-ea"/>
+        <a:cs typeface="+mn-cs"/>
+      </a:defRPr>
+    </a:lvl1pPr>
+    <a:lvl2pPr marL="457200" algn="l" defTabSz="914400" rtl="0" eaLnBrk="1" latinLnBrk="0" hangingPunct="1">
+      <a:defRPr sz="1200" kern="1200">
+        <a:solidFill>
+          <a:schemeClr val="tx1"/>
+        </a:solidFill>
+        <a:latin typeface="+mn-lt"/>
+        <a:ea typeface="+mn-ea"/>
+        <a:cs typeface="+mn-cs"/>
+      </a:defRPr>
+    </a:lvl2pPr>
+    <a:lvl3pPr marL="914400" algn="l" defTabSz="914400" rtl="0" eaLnBrk="1" latinLnBrk="0" hangingPunct="1">
+      <a:defRPr sz="1200" kern="1200">
+        <a:solidFill>
+          <a:schemeClr val="tx1"/>
+        </a:solidFill>
+        <a:latin typeface="+mn-lt"/>
+        <a:ea typeface="+mn-ea"/>
+        <a:cs typeface="+mn-cs"/>
+      </a:defRPr>
+    </a:lvl3pPr>
+    <a:lvl4pPr marL="1371600" algn="l" defTabSz="914400" rtl="0" eaLnBrk="1" latinLnBrk="0" hangingPunct="1">
+      <a:defRPr sz="1200" kern="1200">
+        <a:solidFill>
+          <a:schemeClr val="tx1"/>
+        </a:solidFill>
+        <a:latin typeface="+mn-lt"/>
+        <a:ea typeface="+mn-ea"/>
+        <a:cs typeface="+mn-cs"/>
+      </a:defRPr>
+    </a:lvl4pPr>
+    <a:lvl5pPr marL="1828800" algn="l" defTabSz="914400" rtl="0" eaLnBrk="1" latinLnBrk="0" hangingPunct="1">
+      <a:defRPr sz="1200" kern="1200">
+        <a:solidFill>
+          <a:schemeClr val="tx1"/>
+        </a:solidFill>
+        <a:latin typeface="+mn-lt"/>
+        <a:ea typeface="+mn-ea"/>
+        <a:cs typeface="+mn-cs"/>
+      </a:defRPr>
+    </a:lvl5pPr>
+    <a:lvl6pPr marL="2286000" algn="l" defTabSz="914400" rtl="0" eaLnBrk="1" latinLnBrk="0" hangingPunct="1">
+      <a:defRPr sz="1200" kern="1200">
+        <a:solidFill>
+          <a:schemeClr val="tx1"/>
+        </a:solidFill>
+        <a:latin typeface="+mn-lt"/>
+        <a:ea typeface="+mn-ea"/>
+        <a:cs typeface="+mn-cs"/>
+      </a:defRPr>
+    </a:lvl6pPr>
+    <a:lvl7pPr marL="2743200" algn="l" defTabSz="914400" rtl="0" eaLnBrk="1" latinLnBrk="0" hangingPunct="1">
+      <a:defRPr sz="1200" kern="1200">
+        <a:solidFill>
+          <a:schemeClr val="tx1"/>
+        </a:solidFill>
+        <a:latin typeface="+mn-lt"/>
+        <a:ea typeface="+mn-ea"/>
+        <a:cs typeface="+mn-cs"/>
+      </a:defRPr>
+    </a:lvl7pPr>
+    <a:lvl8pPr marL="3200400" algn="l" defTabSz="914400" rtl="0" eaLnBrk="1" latinLnBrk="0" hangingPunct="1">
+      <a:defRPr sz="1200" kern="1200">
+        <a:solidFill>
+          <a:schemeClr val="tx1"/>
+        </a:solidFill>
+        <a:latin typeface="+mn-lt"/>
+        <a:ea typeface="+mn-ea"/>
+        <a:cs typeface="+mn-cs"/>
+      </a:defRPr>
+    </a:lvl8pPr>
+    <a:lvl9pPr marL="3657600" algn="l" defTabSz="914400" rtl="0" eaLnBrk="1" latinLnBrk="0" hangingPunct="1">
+      <a:defRPr sz="1200" kern="1200">
+        <a:solidFill>
+          <a:schemeClr val="tx1"/>
+        </a:solidFill>
+        <a:latin typeface="+mn-lt"/>
+        <a:ea typeface="+mn-ea"/>
+        <a:cs typeface="+mn-cs"/>
+      </a:defRPr>
+    </a:lvl9pPr>
+  </p:notesStyle>
+</p:notesMaster>
+</file>
+
+<file path=ppt/notesSlides/notesSlide1.xml><?xml version="1.0" encoding="utf-8"?>
+<p:notes xmlns:a="http://schemas.openxmlformats.org/drawingml/2006/main" xmlns:r="http://schemas.openxmlformats.org/officeDocument/2006/relationships" xmlns:p="http://schemas.openxmlformats.org/presentationml/2006/main">
+  <p:cSld>
+    <p:spTree>
+      <p:nvGrpSpPr>
+        <p:cNvPr id="1" name=""/>
+        <p:cNvGrpSpPr/>
+        <p:nvPr/>
+      </p:nvGrpSpPr>
+      <p:grpSpPr>
+        <a:xfrm>
+          <a:off x="0" y="0"/>
+          <a:ext cx="0" cy="0"/>
+          <a:chOff x="0" y="0"/>
+          <a:chExt cx="0" cy="0"/>
+        </a:xfrm>
+      </p:grpSpPr>
+      <p:sp>
+        <p:nvSpPr>
+          <p:cNvPr id="2" name="Slide Image Placeholder 1"/>
+          <p:cNvSpPr>
+            <a:spLocks noGrp="1" noRot="1" noChangeAspect="1"/>
+          </p:cNvSpPr>
+          <p:nvPr>
+            <p:ph type="sldImg"/>
+          </p:nvPr>
+        </p:nvSpPr>
+        <p:spPr/>
+      </p:sp>
+      <p:sp>
+        <p:nvSpPr>
+          <p:cNvPr id="3" name="Notes Placeholder 2"/>
+          <p:cNvSpPr>
+            <a:spLocks noGrp="1"/>
+          </p:cNvSpPr>
+          <p:nvPr>
+            <p:ph type="body" idx="1"/>
+          </p:nvPr>
+        </p:nvSpPr>
+        <p:spPr/>
+        <p:txBody>
+          <a:bodyPr/>
+          <a:lstStyle/>
+          <a:p>
+            <a:endParaRPr lang="es-AR" dirty="0"/>
+          </a:p>
+        </p:txBody>
+      </p:sp>
+      <p:sp>
+        <p:nvSpPr>
+          <p:cNvPr id="4" name="Slide Number Placeholder 3"/>
+          <p:cNvSpPr>
+            <a:spLocks noGrp="1"/>
+          </p:cNvSpPr>
+          <p:nvPr>
+            <p:ph type="sldNum" sz="quarter" idx="10"/>
+          </p:nvPr>
+        </p:nvSpPr>
+        <p:spPr/>
+        <p:txBody>
+          <a:bodyPr/>
+          <a:lstStyle/>
+          <a:p>
+            <a:fld id="{DAB44264-54AC-4658-AFE4-D5385AA3C409}" type="slidenum">
+              <a:rPr lang="es-AR" smtClean="0"/>
+              <a:t>7</a:t>
+            </a:fld>
+            <a:endParaRPr lang="es-AR"/>
+          </a:p>
+        </p:txBody>
+      </p:sp>
+    </p:spTree>
+    <p:extLst>
+      <p:ext uri="{BB962C8B-B14F-4D97-AF65-F5344CB8AC3E}">
+        <p14:creationId xmlns:p14="http://schemas.microsoft.com/office/powerpoint/2010/main" val="3712171478"/>
+      </p:ext>
+    </p:extLst>
+  </p:cSld>
+  <p:clrMapOvr>
+    <a:masterClrMapping/>
+  </p:clrMapOvr>
+</p:notes>
 </file>
 
 <file path=ppt/slideLayouts/slideLayout1.xml><?xml version="1.0" encoding="utf-8"?>
@@ -338,7 +777,7 @@
             <a:fld id="{37257250-85BF-4CE9-8829-60D0CC99FEAA}" type="datetimeFigureOut">
               <a:rPr lang="es-AR" smtClean="0"/>
               <a:pPr/>
-              <a:t>22/09/2013</a:t>
+              <a:t>23/09/2013</a:t>
             </a:fld>
             <a:endParaRPr lang="es-AR"/>
           </a:p>
@@ -401,7 +840,7 @@
             <a:fld id="{5D54C5B7-6535-45F6-B87D-0A10CE9C57BD}" type="slidenum">
               <a:rPr lang="es-AR" smtClean="0"/>
               <a:pPr/>
-              <a:t>‹Nº›</a:t>
+              <a:t>‹#›</a:t>
             </a:fld>
             <a:endParaRPr lang="es-AR"/>
           </a:p>
@@ -410,7 +849,7 @@
     </p:spTree>
     <p:extLst>
       <p:ext uri="{BB962C8B-B14F-4D97-AF65-F5344CB8AC3E}">
-        <p14:creationId xmlns:p14="http://schemas.microsoft.com/office/powerpoint/2010/main" xmlns="" val="2387916325"/>
+        <p14:creationId xmlns:p14="http://schemas.microsoft.com/office/powerpoint/2010/main" val="2387916325"/>
       </p:ext>
     </p:extLst>
   </p:cSld>
@@ -530,7 +969,7 @@
             <a:fld id="{37257250-85BF-4CE9-8829-60D0CC99FEAA}" type="datetimeFigureOut">
               <a:rPr lang="es-AR" smtClean="0"/>
               <a:pPr/>
-              <a:t>22/09/2013</a:t>
+              <a:t>23/09/2013</a:t>
             </a:fld>
             <a:endParaRPr lang="es-AR"/>
           </a:p>
@@ -573,7 +1012,7 @@
             <a:fld id="{5D54C5B7-6535-45F6-B87D-0A10CE9C57BD}" type="slidenum">
               <a:rPr lang="es-AR" smtClean="0"/>
               <a:pPr/>
-              <a:t>‹Nº›</a:t>
+              <a:t>‹#›</a:t>
             </a:fld>
             <a:endParaRPr lang="es-AR"/>
           </a:p>
@@ -582,7 +1021,7 @@
     </p:spTree>
     <p:extLst>
       <p:ext uri="{BB962C8B-B14F-4D97-AF65-F5344CB8AC3E}">
-        <p14:creationId xmlns:p14="http://schemas.microsoft.com/office/powerpoint/2010/main" xmlns="" val="599926953"/>
+        <p14:creationId xmlns:p14="http://schemas.microsoft.com/office/powerpoint/2010/main" val="599926953"/>
       </p:ext>
     </p:extLst>
   </p:cSld>
@@ -712,7 +1151,7 @@
             <a:fld id="{37257250-85BF-4CE9-8829-60D0CC99FEAA}" type="datetimeFigureOut">
               <a:rPr lang="es-AR" smtClean="0"/>
               <a:pPr/>
-              <a:t>22/09/2013</a:t>
+              <a:t>23/09/2013</a:t>
             </a:fld>
             <a:endParaRPr lang="es-AR"/>
           </a:p>
@@ -755,7 +1194,7 @@
             <a:fld id="{5D54C5B7-6535-45F6-B87D-0A10CE9C57BD}" type="slidenum">
               <a:rPr lang="es-AR" smtClean="0"/>
               <a:pPr/>
-              <a:t>‹Nº›</a:t>
+              <a:t>‹#›</a:t>
             </a:fld>
             <a:endParaRPr lang="es-AR"/>
           </a:p>
@@ -764,7 +1203,7 @@
     </p:spTree>
     <p:extLst>
       <p:ext uri="{BB962C8B-B14F-4D97-AF65-F5344CB8AC3E}">
-        <p14:creationId xmlns:p14="http://schemas.microsoft.com/office/powerpoint/2010/main" xmlns="" val="1132530867"/>
+        <p14:creationId xmlns:p14="http://schemas.microsoft.com/office/powerpoint/2010/main" val="1132530867"/>
       </p:ext>
     </p:extLst>
   </p:cSld>
@@ -884,7 +1323,7 @@
             <a:fld id="{37257250-85BF-4CE9-8829-60D0CC99FEAA}" type="datetimeFigureOut">
               <a:rPr lang="es-AR" smtClean="0"/>
               <a:pPr/>
-              <a:t>22/09/2013</a:t>
+              <a:t>23/09/2013</a:t>
             </a:fld>
             <a:endParaRPr lang="es-AR"/>
           </a:p>
@@ -927,7 +1366,7 @@
             <a:fld id="{5D54C5B7-6535-45F6-B87D-0A10CE9C57BD}" type="slidenum">
               <a:rPr lang="es-AR" smtClean="0"/>
               <a:pPr/>
-              <a:t>‹Nº›</a:t>
+              <a:t>‹#›</a:t>
             </a:fld>
             <a:endParaRPr lang="es-AR"/>
           </a:p>
@@ -936,7 +1375,7 @@
     </p:spTree>
     <p:extLst>
       <p:ext uri="{BB962C8B-B14F-4D97-AF65-F5344CB8AC3E}">
-        <p14:creationId xmlns:p14="http://schemas.microsoft.com/office/powerpoint/2010/main" xmlns="" val="3486428753"/>
+        <p14:creationId xmlns:p14="http://schemas.microsoft.com/office/powerpoint/2010/main" val="3486428753"/>
       </p:ext>
     </p:extLst>
   </p:cSld>
@@ -1142,7 +1581,7 @@
             <a:fld id="{37257250-85BF-4CE9-8829-60D0CC99FEAA}" type="datetimeFigureOut">
               <a:rPr lang="es-AR" smtClean="0"/>
               <a:pPr/>
-              <a:t>22/09/2013</a:t>
+              <a:t>23/09/2013</a:t>
             </a:fld>
             <a:endParaRPr lang="es-AR"/>
           </a:p>
@@ -1185,7 +1624,7 @@
             <a:fld id="{5D54C5B7-6535-45F6-B87D-0A10CE9C57BD}" type="slidenum">
               <a:rPr lang="es-AR" smtClean="0"/>
               <a:pPr/>
-              <a:t>‹Nº›</a:t>
+              <a:t>‹#›</a:t>
             </a:fld>
             <a:endParaRPr lang="es-AR"/>
           </a:p>
@@ -1194,7 +1633,7 @@
     </p:spTree>
     <p:extLst>
       <p:ext uri="{BB962C8B-B14F-4D97-AF65-F5344CB8AC3E}">
-        <p14:creationId xmlns:p14="http://schemas.microsoft.com/office/powerpoint/2010/main" xmlns="" val="2001868568"/>
+        <p14:creationId xmlns:p14="http://schemas.microsoft.com/office/powerpoint/2010/main" val="2001868568"/>
       </p:ext>
     </p:extLst>
   </p:cSld>
@@ -1432,7 +1871,7 @@
             <a:fld id="{37257250-85BF-4CE9-8829-60D0CC99FEAA}" type="datetimeFigureOut">
               <a:rPr lang="es-AR" smtClean="0"/>
               <a:pPr/>
-              <a:t>22/09/2013</a:t>
+              <a:t>23/09/2013</a:t>
             </a:fld>
             <a:endParaRPr lang="es-AR"/>
           </a:p>
@@ -1475,7 +1914,7 @@
             <a:fld id="{5D54C5B7-6535-45F6-B87D-0A10CE9C57BD}" type="slidenum">
               <a:rPr lang="es-AR" smtClean="0"/>
               <a:pPr/>
-              <a:t>‹Nº›</a:t>
+              <a:t>‹#›</a:t>
             </a:fld>
             <a:endParaRPr lang="es-AR"/>
           </a:p>
@@ -1484,7 +1923,7 @@
     </p:spTree>
     <p:extLst>
       <p:ext uri="{BB962C8B-B14F-4D97-AF65-F5344CB8AC3E}">
-        <p14:creationId xmlns:p14="http://schemas.microsoft.com/office/powerpoint/2010/main" xmlns="" val="645645608"/>
+        <p14:creationId xmlns:p14="http://schemas.microsoft.com/office/powerpoint/2010/main" val="645645608"/>
       </p:ext>
     </p:extLst>
   </p:cSld>
@@ -1872,7 +2311,7 @@
             <a:fld id="{37257250-85BF-4CE9-8829-60D0CC99FEAA}" type="datetimeFigureOut">
               <a:rPr lang="es-AR" smtClean="0"/>
               <a:pPr/>
-              <a:t>22/09/2013</a:t>
+              <a:t>23/09/2013</a:t>
             </a:fld>
             <a:endParaRPr lang="es-AR"/>
           </a:p>
@@ -1915,7 +2354,7 @@
             <a:fld id="{5D54C5B7-6535-45F6-B87D-0A10CE9C57BD}" type="slidenum">
               <a:rPr lang="es-AR" smtClean="0"/>
               <a:pPr/>
-              <a:t>‹Nº›</a:t>
+              <a:t>‹#›</a:t>
             </a:fld>
             <a:endParaRPr lang="es-AR"/>
           </a:p>
@@ -1924,7 +2363,7 @@
     </p:spTree>
     <p:extLst>
       <p:ext uri="{BB962C8B-B14F-4D97-AF65-F5344CB8AC3E}">
-        <p14:creationId xmlns:p14="http://schemas.microsoft.com/office/powerpoint/2010/main" xmlns="" val="532310638"/>
+        <p14:creationId xmlns:p14="http://schemas.microsoft.com/office/powerpoint/2010/main" val="532310638"/>
       </p:ext>
     </p:extLst>
   </p:cSld>
@@ -1992,7 +2431,7 @@
             <a:fld id="{37257250-85BF-4CE9-8829-60D0CC99FEAA}" type="datetimeFigureOut">
               <a:rPr lang="es-AR" smtClean="0"/>
               <a:pPr/>
-              <a:t>22/09/2013</a:t>
+              <a:t>23/09/2013</a:t>
             </a:fld>
             <a:endParaRPr lang="es-AR"/>
           </a:p>
@@ -2035,7 +2474,7 @@
             <a:fld id="{5D54C5B7-6535-45F6-B87D-0A10CE9C57BD}" type="slidenum">
               <a:rPr lang="es-AR" smtClean="0"/>
               <a:pPr/>
-              <a:t>‹Nº›</a:t>
+              <a:t>‹#›</a:t>
             </a:fld>
             <a:endParaRPr lang="es-AR"/>
           </a:p>
@@ -2044,7 +2483,7 @@
     </p:spTree>
     <p:extLst>
       <p:ext uri="{BB962C8B-B14F-4D97-AF65-F5344CB8AC3E}">
-        <p14:creationId xmlns:p14="http://schemas.microsoft.com/office/powerpoint/2010/main" xmlns="" val="2854672547"/>
+        <p14:creationId xmlns:p14="http://schemas.microsoft.com/office/powerpoint/2010/main" val="2854672547"/>
       </p:ext>
     </p:extLst>
   </p:cSld>
@@ -2089,7 +2528,7 @@
             <a:fld id="{37257250-85BF-4CE9-8829-60D0CC99FEAA}" type="datetimeFigureOut">
               <a:rPr lang="es-AR" smtClean="0"/>
               <a:pPr/>
-              <a:t>22/09/2013</a:t>
+              <a:t>23/09/2013</a:t>
             </a:fld>
             <a:endParaRPr lang="es-AR"/>
           </a:p>
@@ -2132,7 +2571,7 @@
             <a:fld id="{5D54C5B7-6535-45F6-B87D-0A10CE9C57BD}" type="slidenum">
               <a:rPr lang="es-AR" smtClean="0"/>
               <a:pPr/>
-              <a:t>‹Nº›</a:t>
+              <a:t>‹#›</a:t>
             </a:fld>
             <a:endParaRPr lang="es-AR"/>
           </a:p>
@@ -2141,7 +2580,7 @@
     </p:spTree>
     <p:extLst>
       <p:ext uri="{BB962C8B-B14F-4D97-AF65-F5344CB8AC3E}">
-        <p14:creationId xmlns:p14="http://schemas.microsoft.com/office/powerpoint/2010/main" xmlns="" val="1207526025"/>
+        <p14:creationId xmlns:p14="http://schemas.microsoft.com/office/powerpoint/2010/main" val="1207526025"/>
       </p:ext>
     </p:extLst>
   </p:cSld>
@@ -2447,7 +2886,7 @@
             <a:fld id="{37257250-85BF-4CE9-8829-60D0CC99FEAA}" type="datetimeFigureOut">
               <a:rPr lang="es-AR" smtClean="0"/>
               <a:pPr/>
-              <a:t>22/09/2013</a:t>
+              <a:t>23/09/2013</a:t>
             </a:fld>
             <a:endParaRPr lang="es-AR"/>
           </a:p>
@@ -2500,7 +2939,7 @@
             <a:fld id="{5D54C5B7-6535-45F6-B87D-0A10CE9C57BD}" type="slidenum">
               <a:rPr lang="es-AR" smtClean="0"/>
               <a:pPr/>
-              <a:t>‹Nº›</a:t>
+              <a:t>‹#›</a:t>
             </a:fld>
             <a:endParaRPr lang="es-AR"/>
           </a:p>
@@ -2509,7 +2948,7 @@
     </p:spTree>
     <p:extLst>
       <p:ext uri="{BB962C8B-B14F-4D97-AF65-F5344CB8AC3E}">
-        <p14:creationId xmlns:p14="http://schemas.microsoft.com/office/powerpoint/2010/main" xmlns="" val="692071596"/>
+        <p14:creationId xmlns:p14="http://schemas.microsoft.com/office/powerpoint/2010/main" val="692071596"/>
       </p:ext>
     </p:extLst>
   </p:cSld>
@@ -2768,7 +3207,7 @@
             <a:fld id="{37257250-85BF-4CE9-8829-60D0CC99FEAA}" type="datetimeFigureOut">
               <a:rPr lang="es-AR" smtClean="0"/>
               <a:pPr/>
-              <a:t>22/09/2013</a:t>
+              <a:t>23/09/2013</a:t>
             </a:fld>
             <a:endParaRPr lang="es-AR"/>
           </a:p>
@@ -2831,7 +3270,7 @@
             <a:fld id="{5D54C5B7-6535-45F6-B87D-0A10CE9C57BD}" type="slidenum">
               <a:rPr lang="es-AR" smtClean="0"/>
               <a:pPr/>
-              <a:t>‹Nº›</a:t>
+              <a:t>‹#›</a:t>
             </a:fld>
             <a:endParaRPr lang="es-AR"/>
           </a:p>
@@ -2840,7 +3279,7 @@
     </p:spTree>
     <p:extLst>
       <p:ext uri="{BB962C8B-B14F-4D97-AF65-F5344CB8AC3E}">
-        <p14:creationId xmlns:p14="http://schemas.microsoft.com/office/powerpoint/2010/main" xmlns="" val="975840812"/>
+        <p14:creationId xmlns:p14="http://schemas.microsoft.com/office/powerpoint/2010/main" val="975840812"/>
       </p:ext>
     </p:extLst>
   </p:cSld>
@@ -3003,7 +3442,7 @@
             <a:fld id="{37257250-85BF-4CE9-8829-60D0CC99FEAA}" type="datetimeFigureOut">
               <a:rPr lang="es-AR" smtClean="0"/>
               <a:pPr/>
-              <a:t>22/09/2013</a:t>
+              <a:t>23/09/2013</a:t>
             </a:fld>
             <a:endParaRPr lang="es-AR"/>
           </a:p>
@@ -3086,7 +3525,7 @@
             <a:fld id="{5D54C5B7-6535-45F6-B87D-0A10CE9C57BD}" type="slidenum">
               <a:rPr lang="es-AR" smtClean="0"/>
               <a:pPr/>
-              <a:t>‹Nº›</a:t>
+              <a:t>‹#›</a:t>
             </a:fld>
             <a:endParaRPr lang="es-AR"/>
           </a:p>
@@ -3095,7 +3534,7 @@
     </p:spTree>
     <p:extLst>
       <p:ext uri="{BB962C8B-B14F-4D97-AF65-F5344CB8AC3E}">
-        <p14:creationId xmlns:p14="http://schemas.microsoft.com/office/powerpoint/2010/main" xmlns="" val="4148694763"/>
+        <p14:creationId xmlns:p14="http://schemas.microsoft.com/office/powerpoint/2010/main" val="4148694763"/>
       </p:ext>
     </p:extLst>
   </p:cSld>
@@ -3647,11 +4086,7 @@
             <a:pPr algn="ctr"/>
             <a:r>
               <a:rPr lang="es-AR" dirty="0" smtClean="0"/>
-              <a:t>Sprint #</a:t>
-            </a:r>
-            <a:r>
-              <a:rPr lang="es-AR" dirty="0" smtClean="0"/>
-              <a:t>02 </a:t>
+              <a:t>Sprint #02 </a:t>
             </a:r>
             <a:r>
               <a:rPr lang="es-AR" dirty="0" err="1" smtClean="0"/>
@@ -3749,11 +4184,7 @@
             <a:pPr algn="ctr"/>
             <a:r>
               <a:rPr lang="es-AR" dirty="0" smtClean="0"/>
-              <a:t>Sprint #</a:t>
-            </a:r>
-            <a:r>
-              <a:rPr lang="es-AR" dirty="0" smtClean="0"/>
-              <a:t>02 </a:t>
+              <a:t>Sprint #02 </a:t>
             </a:r>
             <a:r>
               <a:rPr lang="es-AR" dirty="0" err="1" smtClean="0"/>
@@ -3859,11 +4290,7 @@
             </a:r>
             <a:r>
               <a:rPr lang="es-AR" dirty="0" smtClean="0"/>
-              <a:t> </a:t>
-            </a:r>
-            <a:r>
-              <a:rPr lang="es-AR" dirty="0" smtClean="0"/>
-              <a:t>Chart	</a:t>
+              <a:t> Chart	</a:t>
             </a:r>
             <a:endParaRPr lang="es-AR" dirty="0"/>
           </a:p>
@@ -3901,35 +4328,26 @@
       </p:sp>
       <p:pic>
         <p:nvPicPr>
-          <p:cNvPr id="9218" name="Picture 2"/>
+          <p:cNvPr id="5" name="Picture 4"/>
           <p:cNvPicPr>
-            <a:picLocks noChangeAspect="1" noChangeArrowheads="1"/>
+            <a:picLocks noChangeAspect="1"/>
           </p:cNvPicPr>
           <p:nvPr/>
         </p:nvPicPr>
         <p:blipFill>
           <a:blip r:embed="rId2"/>
-          <a:srcRect/>
           <a:stretch>
             <a:fillRect/>
           </a:stretch>
         </p:blipFill>
-        <p:spPr bwMode="auto">
-          <a:xfrm>
-            <a:off x="428596" y="1928802"/>
-            <a:ext cx="8501090" cy="3711926"/>
+        <p:spPr>
+          <a:xfrm>
+            <a:off x="162446" y="1844824"/>
+            <a:ext cx="8723381" cy="4156639"/>
           </a:xfrm>
           <a:prstGeom prst="rect">
             <a:avLst/>
           </a:prstGeom>
-          <a:noFill/>
-          <a:ln w="9525">
-            <a:noFill/>
-            <a:miter lim="800000"/>
-            <a:headEnd/>
-            <a:tailEnd/>
-          </a:ln>
-          <a:effectLst/>
         </p:spPr>
       </p:pic>
     </p:spTree>
@@ -3987,11 +4405,7 @@
             <a:pPr algn="ctr"/>
             <a:r>
               <a:rPr lang="es-AR" dirty="0" smtClean="0"/>
-              <a:t>Sprint #02 </a:t>
-            </a:r>
-            <a:r>
-              <a:rPr lang="es-AR" dirty="0" smtClean="0"/>
-              <a:t>Riesgos</a:t>
+              <a:t>Sprint #02 Riesgos</a:t>
             </a:r>
             <a:endParaRPr lang="es-AR" dirty="0"/>
           </a:p>
@@ -4085,11 +4499,7 @@
             <a:pPr algn="ctr"/>
             <a:r>
               <a:rPr lang="es-AR" dirty="0" smtClean="0"/>
-              <a:t>Sprint #02 </a:t>
-            </a:r>
-            <a:r>
-              <a:rPr lang="es-AR" dirty="0" smtClean="0"/>
-              <a:t>Plan de riesgos</a:t>
+              <a:t>Sprint #02 Plan de riesgos</a:t>
             </a:r>
             <a:endParaRPr lang="es-AR" dirty="0"/>
           </a:p>
@@ -4183,11 +4593,7 @@
             <a:pPr algn="ctr"/>
             <a:r>
               <a:rPr lang="es-AR" dirty="0" smtClean="0"/>
-              <a:t>Sprint #02 </a:t>
-            </a:r>
-            <a:r>
-              <a:rPr lang="es-AR" dirty="0" smtClean="0"/>
-              <a:t>Cliente </a:t>
+              <a:t>Sprint #02 Cliente </a:t>
             </a:r>
             <a:r>
               <a:rPr lang="es-AR" dirty="0" err="1" smtClean="0"/>
@@ -4306,6 +4712,288 @@
         </p:spPr>
       </p:pic>
     </p:spTree>
+  </p:cSld>
+  <p:clrMapOvr>
+    <a:masterClrMapping/>
+  </p:clrMapOvr>
+  <p:timing>
+    <p:tnLst>
+      <p:par>
+        <p:cTn id="1" dur="indefinite" restart="never" nodeType="tmRoot"/>
+      </p:par>
+    </p:tnLst>
+  </p:timing>
+</p:sld>
+</file>
+
+<file path=ppt/slides/slide16.xml><?xml version="1.0" encoding="utf-8"?>
+<p:sld xmlns:a="http://schemas.openxmlformats.org/drawingml/2006/main" xmlns:r="http://schemas.openxmlformats.org/officeDocument/2006/relationships" xmlns:p="http://schemas.openxmlformats.org/presentationml/2006/main">
+  <p:cSld>
+    <p:spTree>
+      <p:nvGrpSpPr>
+        <p:cNvPr id="1" name=""/>
+        <p:cNvGrpSpPr/>
+        <p:nvPr/>
+      </p:nvGrpSpPr>
+      <p:grpSpPr>
+        <a:xfrm>
+          <a:off x="0" y="0"/>
+          <a:ext cx="0" cy="0"/>
+          <a:chOff x="0" y="0"/>
+          <a:chExt cx="0" cy="0"/>
+        </a:xfrm>
+      </p:grpSpPr>
+      <p:sp>
+        <p:nvSpPr>
+          <p:cNvPr id="2" name="1 Título"/>
+          <p:cNvSpPr>
+            <a:spLocks noGrp="1"/>
+          </p:cNvSpPr>
+          <p:nvPr>
+            <p:ph type="title"/>
+          </p:nvPr>
+        </p:nvSpPr>
+        <p:spPr>
+          <a:xfrm>
+            <a:off x="457200" y="214290"/>
+            <a:ext cx="8229600" cy="1143000"/>
+          </a:xfrm>
+        </p:spPr>
+        <p:txBody>
+          <a:bodyPr/>
+          <a:lstStyle/>
+          <a:p>
+            <a:pPr algn="ctr"/>
+            <a:r>
+              <a:rPr lang="es-AR" dirty="0" smtClean="0"/>
+              <a:t>Sprint #02 </a:t>
+            </a:r>
+            <a:r>
+              <a:rPr lang="es-AR" dirty="0" smtClean="0"/>
+              <a:t>Lista Pel</a:t>
+            </a:r>
+            <a:r>
+              <a:rPr lang="es-AR" dirty="0" smtClean="0"/>
+              <a:t>ículas</a:t>
+            </a:r>
+            <a:endParaRPr lang="es-AR" dirty="0"/>
+          </a:p>
+        </p:txBody>
+      </p:sp>
+      <p:sp>
+        <p:nvSpPr>
+          <p:cNvPr id="12290" name="AutoShape 2" descr="mailbox://C:/Users/MATIAS/AppData/Roaming/Thunderbird/Profiles/lffj61ec.default/Mail/pop.googlemail.com/Inbox?number=428921453&amp;part=1.3"/>
+          <p:cNvSpPr>
+            <a:spLocks noChangeAspect="1" noChangeArrowheads="1"/>
+          </p:cNvSpPr>
+          <p:nvPr/>
+        </p:nvSpPr>
+        <p:spPr bwMode="auto">
+          <a:xfrm>
+            <a:off x="155575" y="-4144963"/>
+            <a:ext cx="4867275" cy="8648701"/>
+          </a:xfrm>
+          <a:prstGeom prst="rect">
+            <a:avLst/>
+          </a:prstGeom>
+          <a:noFill/>
+        </p:spPr>
+        <p:txBody>
+          <a:bodyPr vert="horz" wrap="square" lIns="91440" tIns="45720" rIns="91440" bIns="45720" numCol="1" anchor="t" anchorCtr="0" compatLnSpc="1">
+            <a:prstTxWarp prst="textNoShape">
+              <a:avLst/>
+            </a:prstTxWarp>
+          </a:bodyPr>
+          <a:lstStyle/>
+          <a:p>
+            <a:endParaRPr lang="es-AR"/>
+          </a:p>
+        </p:txBody>
+      </p:sp>
+      <p:pic>
+        <p:nvPicPr>
+          <p:cNvPr id="6" name="Picture 5"/>
+          <p:cNvPicPr>
+            <a:picLocks noChangeAspect="1"/>
+          </p:cNvPicPr>
+          <p:nvPr/>
+        </p:nvPicPr>
+        <p:blipFill>
+          <a:blip r:embed="rId2"/>
+          <a:stretch>
+            <a:fillRect/>
+          </a:stretch>
+        </p:blipFill>
+        <p:spPr>
+          <a:xfrm>
+            <a:off x="1407888" y="1338413"/>
+            <a:ext cx="6328224" cy="4820872"/>
+          </a:xfrm>
+          <a:prstGeom prst="rect">
+            <a:avLst/>
+          </a:prstGeom>
+        </p:spPr>
+      </p:pic>
+    </p:spTree>
+    <p:extLst>
+      <p:ext uri="{BB962C8B-B14F-4D97-AF65-F5344CB8AC3E}">
+        <p14:creationId xmlns:p14="http://schemas.microsoft.com/office/powerpoint/2010/main" val="3682612548"/>
+      </p:ext>
+    </p:extLst>
+  </p:cSld>
+  <p:clrMapOvr>
+    <a:masterClrMapping/>
+  </p:clrMapOvr>
+  <p:timing>
+    <p:tnLst>
+      <p:par>
+        <p:cTn id="1" dur="indefinite" restart="never" nodeType="tmRoot"/>
+      </p:par>
+    </p:tnLst>
+  </p:timing>
+</p:sld>
+</file>
+
+<file path=ppt/slides/slide17.xml><?xml version="1.0" encoding="utf-8"?>
+<p:sld xmlns:a="http://schemas.openxmlformats.org/drawingml/2006/main" xmlns:r="http://schemas.openxmlformats.org/officeDocument/2006/relationships" xmlns:p="http://schemas.openxmlformats.org/presentationml/2006/main">
+  <p:cSld>
+    <p:spTree>
+      <p:nvGrpSpPr>
+        <p:cNvPr id="1" name=""/>
+        <p:cNvGrpSpPr/>
+        <p:nvPr/>
+      </p:nvGrpSpPr>
+      <p:grpSpPr>
+        <a:xfrm>
+          <a:off x="0" y="0"/>
+          <a:ext cx="0" cy="0"/>
+          <a:chOff x="0" y="0"/>
+          <a:chExt cx="0" cy="0"/>
+        </a:xfrm>
+      </p:grpSpPr>
+      <p:sp>
+        <p:nvSpPr>
+          <p:cNvPr id="2" name="1 Título"/>
+          <p:cNvSpPr>
+            <a:spLocks noGrp="1"/>
+          </p:cNvSpPr>
+          <p:nvPr>
+            <p:ph type="title"/>
+          </p:nvPr>
+        </p:nvSpPr>
+        <p:spPr>
+          <a:xfrm>
+            <a:off x="457200" y="214290"/>
+            <a:ext cx="8229600" cy="1143000"/>
+          </a:xfrm>
+        </p:spPr>
+        <p:txBody>
+          <a:bodyPr>
+            <a:normAutofit fontScale="90000"/>
+          </a:bodyPr>
+          <a:lstStyle/>
+          <a:p>
+            <a:pPr algn="ctr"/>
+            <a:r>
+              <a:rPr lang="es-AR" dirty="0" smtClean="0"/>
+              <a:t>Sprint #02 </a:t>
+            </a:r>
+            <a:r>
+              <a:rPr lang="es-AR" dirty="0" smtClean="0"/>
+              <a:t>Lista Pel</a:t>
+            </a:r>
+            <a:r>
+              <a:rPr lang="es-AR" dirty="0" smtClean="0"/>
+              <a:t>ículas - Alternativa</a:t>
+            </a:r>
+            <a:endParaRPr lang="es-AR" dirty="0"/>
+          </a:p>
+        </p:txBody>
+      </p:sp>
+      <p:sp>
+        <p:nvSpPr>
+          <p:cNvPr id="12290" name="AutoShape 2" descr="mailbox://C:/Users/MATIAS/AppData/Roaming/Thunderbird/Profiles/lffj61ec.default/Mail/pop.googlemail.com/Inbox?number=428921453&amp;part=1.3"/>
+          <p:cNvSpPr>
+            <a:spLocks noChangeAspect="1" noChangeArrowheads="1"/>
+          </p:cNvSpPr>
+          <p:nvPr/>
+        </p:nvSpPr>
+        <p:spPr bwMode="auto">
+          <a:xfrm>
+            <a:off x="155575" y="-4144963"/>
+            <a:ext cx="4867275" cy="8648701"/>
+          </a:xfrm>
+          <a:prstGeom prst="rect">
+            <a:avLst/>
+          </a:prstGeom>
+          <a:noFill/>
+        </p:spPr>
+        <p:txBody>
+          <a:bodyPr vert="horz" wrap="square" lIns="91440" tIns="45720" rIns="91440" bIns="45720" numCol="1" anchor="t" anchorCtr="0" compatLnSpc="1">
+            <a:prstTxWarp prst="textNoShape">
+              <a:avLst/>
+            </a:prstTxWarp>
+          </a:bodyPr>
+          <a:lstStyle/>
+          <a:p>
+            <a:endParaRPr lang="es-AR"/>
+          </a:p>
+        </p:txBody>
+      </p:sp>
+      <p:pic>
+        <p:nvPicPr>
+          <p:cNvPr id="3" name="Picture 2"/>
+          <p:cNvPicPr>
+            <a:picLocks noChangeAspect="1"/>
+          </p:cNvPicPr>
+          <p:nvPr/>
+        </p:nvPicPr>
+        <p:blipFill>
+          <a:blip r:embed="rId2"/>
+          <a:stretch>
+            <a:fillRect/>
+          </a:stretch>
+        </p:blipFill>
+        <p:spPr>
+          <a:xfrm>
+            <a:off x="323528" y="1196752"/>
+            <a:ext cx="7800906" cy="4203124"/>
+          </a:xfrm>
+          <a:prstGeom prst="rect">
+            <a:avLst/>
+          </a:prstGeom>
+        </p:spPr>
+      </p:pic>
+      <p:pic>
+        <p:nvPicPr>
+          <p:cNvPr id="4" name="Picture 3"/>
+          <p:cNvPicPr>
+            <a:picLocks noChangeAspect="1"/>
+          </p:cNvPicPr>
+          <p:nvPr/>
+        </p:nvPicPr>
+        <p:blipFill>
+          <a:blip r:embed="rId3"/>
+          <a:stretch>
+            <a:fillRect/>
+          </a:stretch>
+        </p:blipFill>
+        <p:spPr>
+          <a:xfrm>
+            <a:off x="5292080" y="4599576"/>
+            <a:ext cx="3533632" cy="1903919"/>
+          </a:xfrm>
+          <a:prstGeom prst="rect">
+            <a:avLst/>
+          </a:prstGeom>
+        </p:spPr>
+      </p:pic>
+    </p:spTree>
+    <p:extLst>
+      <p:ext uri="{BB962C8B-B14F-4D97-AF65-F5344CB8AC3E}">
+        <p14:creationId xmlns:p14="http://schemas.microsoft.com/office/powerpoint/2010/main" val="1118828118"/>
+      </p:ext>
+    </p:extLst>
   </p:cSld>
   <p:clrMapOvr>
     <a:masterClrMapping/>
@@ -4360,15 +5048,7 @@
             <a:pPr algn="ctr"/>
             <a:r>
               <a:rPr lang="en-US" dirty="0" smtClean="0"/>
-              <a:t>Sprint #</a:t>
-            </a:r>
-            <a:r>
-              <a:rPr lang="en-US" dirty="0" smtClean="0"/>
-              <a:t>02 </a:t>
-            </a:r>
-            <a:r>
-              <a:rPr lang="en-US" dirty="0" smtClean="0"/>
-              <a:t>- </a:t>
+              <a:t>Sprint #02 - </a:t>
             </a:r>
             <a:r>
               <a:rPr lang="en-US" dirty="0" err="1" smtClean="0"/>
@@ -4402,11 +5082,7 @@
             </a:pPr>
             <a:r>
               <a:rPr lang="es-AR" dirty="0" smtClean="0"/>
-              <a:t>Implementar la funcionalidad de </a:t>
-            </a:r>
-            <a:r>
-              <a:rPr lang="es-AR" dirty="0" smtClean="0"/>
-              <a:t>ver información de películas en cartelera (</a:t>
+              <a:t>Implementar la funcionalidad de ver información de películas en cartelera (</a:t>
             </a:r>
             <a:r>
               <a:rPr lang="es-AR" dirty="0" err="1" smtClean="0"/>
@@ -4416,7 +5092,6 @@
               <a:rPr lang="es-AR" dirty="0" smtClean="0"/>
               <a:t>)</a:t>
             </a:r>
-            <a:endParaRPr lang="es-AR" dirty="0" smtClean="0"/>
           </a:p>
           <a:p>
             <a:pPr>
@@ -4428,13 +5103,8 @@
             </a:pPr>
             <a:r>
               <a:rPr lang="es-AR" dirty="0" smtClean="0"/>
-              <a:t>Implementar la funcionalidad de </a:t>
-            </a:r>
-            <a:r>
-              <a:rPr lang="es-AR" dirty="0" smtClean="0"/>
-              <a:t>ver lista de películas como administrador</a:t>
-            </a:r>
-            <a:endParaRPr lang="es-AR" dirty="0" smtClean="0"/>
+              <a:t>Implementar la funcionalidad de ver lista de películas como administrador</a:t>
+            </a:r>
           </a:p>
           <a:p>
             <a:pPr>
@@ -4446,11 +5116,7 @@
             </a:pPr>
             <a:r>
               <a:rPr lang="es-AR" dirty="0" smtClean="0"/>
-              <a:t>Implementar la funcionalidad de </a:t>
-            </a:r>
-            <a:r>
-              <a:rPr lang="es-AR" dirty="0" smtClean="0"/>
-              <a:t>cargar una película</a:t>
+              <a:t>Implementar la funcionalidad de cargar una película</a:t>
             </a:r>
           </a:p>
           <a:p>
@@ -4494,7 +5160,6 @@
               <a:rPr lang="es-AR" dirty="0" smtClean="0"/>
               <a:t> en la base de datos de películas</a:t>
             </a:r>
-            <a:endParaRPr lang="es-AR" dirty="0" smtClean="0"/>
           </a:p>
         </p:txBody>
       </p:sp>
@@ -4548,18 +5213,14 @@
         </p:spPr>
         <p:txBody>
           <a:bodyPr>
-            <a:normAutofit fontScale="90000"/>
+            <a:normAutofit/>
           </a:bodyPr>
           <a:lstStyle/>
           <a:p>
             <a:pPr algn="ctr"/>
             <a:r>
               <a:rPr lang="en-US" dirty="0" smtClean="0"/>
-              <a:t>Sprint #</a:t>
-            </a:r>
-            <a:r>
-              <a:rPr lang="en-US" dirty="0" smtClean="0"/>
-              <a:t>02 – </a:t>
+              <a:t>Sprint #02 – </a:t>
             </a:r>
             <a:r>
               <a:rPr lang="en-US" dirty="0" err="1" smtClean="0"/>
@@ -4601,11 +5262,7 @@
             </a:pPr>
             <a:r>
               <a:rPr lang="es-AR" dirty="0" smtClean="0"/>
-              <a:t>Implementar la funcionalidad </a:t>
-            </a:r>
-            <a:r>
-              <a:rPr lang="es-AR" dirty="0" smtClean="0"/>
-              <a:t>de edición de películas</a:t>
+              <a:t>Implementar la funcionalidad de edición de películas</a:t>
             </a:r>
           </a:p>
           <a:p>
@@ -4620,7 +5277,6 @@
               <a:rPr lang="es-AR" dirty="0" smtClean="0"/>
               <a:t>Implementar funcionalidad de búsqueda en la lista de películas del servidor</a:t>
             </a:r>
-            <a:endParaRPr lang="es-AR" dirty="0" smtClean="0"/>
           </a:p>
         </p:txBody>
       </p:sp>
@@ -4679,11 +5335,15 @@
             <a:pPr algn="ctr"/>
             <a:r>
               <a:rPr lang="es-AR" dirty="0" smtClean="0"/>
-              <a:t>Sprint #</a:t>
+              <a:t>Sprint #02 </a:t>
             </a:r>
             <a:r>
               <a:rPr lang="es-AR" dirty="0" smtClean="0"/>
-              <a:t>02 Estimaciones</a:t>
+              <a:t>-  </a:t>
+            </a:r>
+            <a:r>
+              <a:rPr lang="es-AR" dirty="0" err="1" smtClean="0"/>
+              <a:t>Backlog</a:t>
             </a:r>
             <a:endParaRPr lang="es-AR" dirty="0"/>
           </a:p>
@@ -4790,17 +5450,23 @@
           </a:xfrm>
         </p:spPr>
         <p:txBody>
-          <a:bodyPr/>
+          <a:bodyPr>
+            <a:normAutofit/>
+          </a:bodyPr>
           <a:lstStyle/>
           <a:p>
             <a:pPr algn="ctr"/>
             <a:r>
               <a:rPr lang="es-AR" dirty="0" smtClean="0"/>
-              <a:t>Sprint #</a:t>
+              <a:t>Sprint #02 </a:t>
             </a:r>
             <a:r>
               <a:rPr lang="es-AR" dirty="0" smtClean="0"/>
-              <a:t>02 Otras estimaciones</a:t>
+              <a:t>– Edició</a:t>
+            </a:r>
+            <a:r>
+              <a:rPr lang="es-AR" dirty="0" smtClean="0"/>
+              <a:t>n Película</a:t>
             </a:r>
             <a:endParaRPr lang="es-AR" dirty="0"/>
           </a:p>
@@ -4896,11 +5562,7 @@
             <a:pPr algn="ctr"/>
             <a:r>
               <a:rPr lang="es-AR" dirty="0" smtClean="0"/>
-              <a:t>Sprint #</a:t>
-            </a:r>
-            <a:r>
-              <a:rPr lang="es-AR" dirty="0" smtClean="0"/>
-              <a:t>02 </a:t>
+              <a:t>Sprint #02 </a:t>
             </a:r>
             <a:r>
               <a:rPr lang="es-AR" dirty="0" err="1" smtClean="0"/>
@@ -4998,11 +5660,7 @@
             <a:pPr algn="ctr"/>
             <a:r>
               <a:rPr lang="es-AR" dirty="0" smtClean="0"/>
-              <a:t>Sprint #</a:t>
-            </a:r>
-            <a:r>
-              <a:rPr lang="es-AR" dirty="0" smtClean="0"/>
-              <a:t>02 </a:t>
+              <a:t>Sprint #02 </a:t>
             </a:r>
             <a:r>
               <a:rPr lang="es-AR" dirty="0" err="1" smtClean="0"/>
@@ -5021,7 +5679,7 @@
           <p:nvPr/>
         </p:nvPicPr>
         <p:blipFill>
-          <a:blip r:embed="rId2"/>
+          <a:blip r:embed="rId3"/>
           <a:srcRect/>
           <a:stretch>
             <a:fillRect/>
@@ -5045,6 +5703,117 @@
           <a:effectLst/>
         </p:spPr>
       </p:pic>
+      <p:cxnSp>
+        <p:nvCxnSpPr>
+          <p:cNvPr id="4" name="Straight Arrow Connector 3"/>
+          <p:cNvCxnSpPr/>
+          <p:nvPr/>
+        </p:nvCxnSpPr>
+        <p:spPr>
+          <a:xfrm flipV="1">
+            <a:off x="3923928" y="5013176"/>
+            <a:ext cx="2736304" cy="558972"/>
+          </a:xfrm>
+          <a:prstGeom prst="straightConnector1">
+            <a:avLst/>
+          </a:prstGeom>
+          <a:ln>
+            <a:tailEnd type="triangle"/>
+          </a:ln>
+        </p:spPr>
+        <p:style>
+          <a:lnRef idx="1">
+            <a:schemeClr val="dk1"/>
+          </a:lnRef>
+          <a:fillRef idx="0">
+            <a:schemeClr val="dk1"/>
+          </a:fillRef>
+          <a:effectRef idx="0">
+            <a:schemeClr val="dk1"/>
+          </a:effectRef>
+          <a:fontRef idx="minor">
+            <a:schemeClr val="tx1"/>
+          </a:fontRef>
+        </p:style>
+      </p:cxnSp>
+      <p:cxnSp>
+        <p:nvCxnSpPr>
+          <p:cNvPr id="8" name="Straight Arrow Connector 7"/>
+          <p:cNvCxnSpPr/>
+          <p:nvPr/>
+        </p:nvCxnSpPr>
+        <p:spPr>
+          <a:xfrm flipH="1" flipV="1">
+            <a:off x="2123728" y="2951002"/>
+            <a:ext cx="1800200" cy="2621146"/>
+          </a:xfrm>
+          <a:prstGeom prst="straightConnector1">
+            <a:avLst/>
+          </a:prstGeom>
+          <a:ln>
+            <a:tailEnd type="triangle"/>
+          </a:ln>
+        </p:spPr>
+        <p:style>
+          <a:lnRef idx="1">
+            <a:schemeClr val="dk1"/>
+          </a:lnRef>
+          <a:fillRef idx="0">
+            <a:schemeClr val="dk1"/>
+          </a:fillRef>
+          <a:effectRef idx="0">
+            <a:schemeClr val="dk1"/>
+          </a:effectRef>
+          <a:fontRef idx="minor">
+            <a:schemeClr val="tx1"/>
+          </a:fontRef>
+        </p:style>
+      </p:cxnSp>
+      <p:sp>
+        <p:nvSpPr>
+          <p:cNvPr id="11" name="Rectangle 10"/>
+          <p:cNvSpPr/>
+          <p:nvPr/>
+        </p:nvSpPr>
+        <p:spPr>
+          <a:xfrm>
+            <a:off x="2915816" y="5572148"/>
+            <a:ext cx="2592288" cy="809180"/>
+          </a:xfrm>
+          <a:prstGeom prst="rect">
+            <a:avLst/>
+          </a:prstGeom>
+          <a:solidFill>
+            <a:srgbClr val="00B050"/>
+          </a:solidFill>
+        </p:spPr>
+        <p:style>
+          <a:lnRef idx="0">
+            <a:schemeClr val="accent6"/>
+          </a:lnRef>
+          <a:fillRef idx="3">
+            <a:schemeClr val="accent6"/>
+          </a:fillRef>
+          <a:effectRef idx="3">
+            <a:schemeClr val="accent6"/>
+          </a:effectRef>
+          <a:fontRef idx="minor">
+            <a:schemeClr val="lt1"/>
+          </a:fontRef>
+        </p:style>
+        <p:txBody>
+          <a:bodyPr rtlCol="0" anchor="ctr"/>
+          <a:lstStyle/>
+          <a:p>
+            <a:pPr algn="ctr"/>
+            <a:r>
+              <a:rPr lang="en-US" sz="3200" dirty="0" smtClean="0"/>
+              <a:t>Nuevo</a:t>
+            </a:r>
+            <a:endParaRPr lang="es-AR" dirty="0"/>
+          </a:p>
+        </p:txBody>
+      </p:sp>
     </p:spTree>
   </p:cSld>
   <p:clrMapOvr>
@@ -5100,11 +5869,7 @@
             <a:pPr algn="ctr"/>
             <a:r>
               <a:rPr lang="es-AR" dirty="0" smtClean="0"/>
-              <a:t>Sprint #</a:t>
-            </a:r>
-            <a:r>
-              <a:rPr lang="es-AR" dirty="0" smtClean="0"/>
-              <a:t>02 </a:t>
+              <a:t>Sprint #02 </a:t>
             </a:r>
             <a:r>
               <a:rPr lang="es-AR" dirty="0" err="1" smtClean="0"/>
@@ -5235,11 +6000,7 @@
             <a:pPr algn="ctr"/>
             <a:r>
               <a:rPr lang="es-AR" dirty="0" smtClean="0"/>
-              <a:t>Sprint #</a:t>
-            </a:r>
-            <a:r>
-              <a:rPr lang="es-AR" dirty="0" smtClean="0"/>
-              <a:t>02 </a:t>
+              <a:t>Sprint #02 </a:t>
             </a:r>
             <a:r>
               <a:rPr lang="es-AR" dirty="0" err="1" smtClean="0"/>
@@ -5251,35 +6012,26 @@
       </p:sp>
       <p:pic>
         <p:nvPicPr>
-          <p:cNvPr id="6146" name="Picture 2"/>
+          <p:cNvPr id="4" name="Picture 3"/>
           <p:cNvPicPr>
-            <a:picLocks noChangeAspect="1" noChangeArrowheads="1"/>
+            <a:picLocks noChangeAspect="1"/>
           </p:cNvPicPr>
           <p:nvPr/>
         </p:nvPicPr>
         <p:blipFill>
           <a:blip r:embed="rId2"/>
-          <a:srcRect/>
           <a:stretch>
             <a:fillRect/>
           </a:stretch>
         </p:blipFill>
-        <p:spPr bwMode="auto">
-          <a:xfrm>
-            <a:off x="155103" y="1357298"/>
-            <a:ext cx="8529176" cy="4000527"/>
+        <p:spPr>
+          <a:xfrm>
+            <a:off x="1337900" y="980728"/>
+            <a:ext cx="6696744" cy="5553918"/>
           </a:xfrm>
           <a:prstGeom prst="rect">
             <a:avLst/>
           </a:prstGeom>
-          <a:noFill/>
-          <a:ln w="9525">
-            <a:noFill/>
-            <a:miter lim="800000"/>
-            <a:headEnd/>
-            <a:tailEnd/>
-          </a:ln>
-          <a:effectLst/>
         </p:spPr>
       </p:pic>
     </p:spTree>
@@ -5528,7 +6280,268 @@
   <a:extraClrSchemeLst/>
   <a:extLst>
     <a:ext uri="{05A4C25C-085E-4340-85A3-A5531E510DB2}">
-      <thm15:themeFamily xmlns:thm15="http://schemas.microsoft.com/office/thememl/2012/main" xmlns="" name="Metropolitan" id="{4C5440D6-04D2-4954-96CF-F251137069B2}" vid="{79CFCA13-9412-4290-BB4B-85112F88857B}"/>
+      <thm15:themeFamily xmlns:thm15="http://schemas.microsoft.com/office/thememl/2012/main" name="Metropolitan" id="{4C5440D6-04D2-4954-96CF-F251137069B2}" vid="{79CFCA13-9412-4290-BB4B-85112F88857B}"/>
+    </a:ext>
+  </a:extLst>
+</a:theme>
+</file>
+
+<file path=ppt/theme/theme2.xml><?xml version="1.0" encoding="utf-8"?>
+<a:theme xmlns:a="http://schemas.openxmlformats.org/drawingml/2006/main" name="Office Theme">
+  <a:themeElements>
+    <a:clrScheme name="Office">
+      <a:dk1>
+        <a:sysClr val="windowText" lastClr="000000"/>
+      </a:dk1>
+      <a:lt1>
+        <a:sysClr val="window" lastClr="FFFFFF"/>
+      </a:lt1>
+      <a:dk2>
+        <a:srgbClr val="44546A"/>
+      </a:dk2>
+      <a:lt2>
+        <a:srgbClr val="E7E6E6"/>
+      </a:lt2>
+      <a:accent1>
+        <a:srgbClr val="5B9BD5"/>
+      </a:accent1>
+      <a:accent2>
+        <a:srgbClr val="ED7D31"/>
+      </a:accent2>
+      <a:accent3>
+        <a:srgbClr val="A5A5A5"/>
+      </a:accent3>
+      <a:accent4>
+        <a:srgbClr val="FFC000"/>
+      </a:accent4>
+      <a:accent5>
+        <a:srgbClr val="4472C4"/>
+      </a:accent5>
+      <a:accent6>
+        <a:srgbClr val="70AD47"/>
+      </a:accent6>
+      <a:hlink>
+        <a:srgbClr val="0563C1"/>
+      </a:hlink>
+      <a:folHlink>
+        <a:srgbClr val="954F72"/>
+      </a:folHlink>
+    </a:clrScheme>
+    <a:fontScheme name="Office">
+      <a:majorFont>
+        <a:latin typeface="Calibri Light" panose="020F0302020204030204"/>
+        <a:ea typeface=""/>
+        <a:cs typeface=""/>
+        <a:font script="Jpan" typeface="ＭＳ Ｐゴシック"/>
+        <a:font script="Hang" typeface="맑은 고딕"/>
+        <a:font script="Hans" typeface="宋体"/>
+        <a:font script="Hant" typeface="新細明體"/>
+        <a:font script="Arab" typeface="Times New Roman"/>
+        <a:font script="Hebr" typeface="Times New Roman"/>
+        <a:font script="Thai" typeface="Angsana New"/>
+        <a:font script="Ethi" typeface="Nyala"/>
+        <a:font script="Beng" typeface="Vrinda"/>
+        <a:font script="Gujr" typeface="Shruti"/>
+        <a:font script="Khmr" typeface="MoolBoran"/>
+        <a:font script="Knda" typeface="Tunga"/>
+        <a:font script="Guru" typeface="Raavi"/>
+        <a:font script="Cans" typeface="Euphemia"/>
+        <a:font script="Cher" typeface="Plantagenet Cherokee"/>
+        <a:font script="Yiii" typeface="Microsoft Yi Baiti"/>
+        <a:font script="Tibt" typeface="Microsoft Himalaya"/>
+        <a:font script="Thaa" typeface="MV Boli"/>
+        <a:font script="Deva" typeface="Mangal"/>
+        <a:font script="Telu" typeface="Gautami"/>
+        <a:font script="Taml" typeface="Latha"/>
+        <a:font script="Syrc" typeface="Estrangelo Edessa"/>
+        <a:font script="Orya" typeface="Kalinga"/>
+        <a:font script="Mlym" typeface="Kartika"/>
+        <a:font script="Laoo" typeface="DokChampa"/>
+        <a:font script="Sinh" typeface="Iskoola Pota"/>
+        <a:font script="Mong" typeface="Mongolian Baiti"/>
+        <a:font script="Viet" typeface="Times New Roman"/>
+        <a:font script="Uigh" typeface="Microsoft Uighur"/>
+        <a:font script="Geor" typeface="Sylfaen"/>
+      </a:majorFont>
+      <a:minorFont>
+        <a:latin typeface="Calibri" panose="020F0502020204030204"/>
+        <a:ea typeface=""/>
+        <a:cs typeface=""/>
+        <a:font script="Jpan" typeface="ＭＳ Ｐゴシック"/>
+        <a:font script="Hang" typeface="맑은 고딕"/>
+        <a:font script="Hans" typeface="宋体"/>
+        <a:font script="Hant" typeface="新細明體"/>
+        <a:font script="Arab" typeface="Arial"/>
+        <a:font script="Hebr" typeface="Arial"/>
+        <a:font script="Thai" typeface="Cordia New"/>
+        <a:font script="Ethi" typeface="Nyala"/>
+        <a:font script="Beng" typeface="Vrinda"/>
+        <a:font script="Gujr" typeface="Shruti"/>
+        <a:font script="Khmr" typeface="DaunPenh"/>
+        <a:font script="Knda" typeface="Tunga"/>
+        <a:font script="Guru" typeface="Raavi"/>
+        <a:font script="Cans" typeface="Euphemia"/>
+        <a:font script="Cher" typeface="Plantagenet Cherokee"/>
+        <a:font script="Yiii" typeface="Microsoft Yi Baiti"/>
+        <a:font script="Tibt" typeface="Microsoft Himalaya"/>
+        <a:font script="Thaa" typeface="MV Boli"/>
+        <a:font script="Deva" typeface="Mangal"/>
+        <a:font script="Telu" typeface="Gautami"/>
+        <a:font script="Taml" typeface="Latha"/>
+        <a:font script="Syrc" typeface="Estrangelo Edessa"/>
+        <a:font script="Orya" typeface="Kalinga"/>
+        <a:font script="Mlym" typeface="Kartika"/>
+        <a:font script="Laoo" typeface="DokChampa"/>
+        <a:font script="Sinh" typeface="Iskoola Pota"/>
+        <a:font script="Mong" typeface="Mongolian Baiti"/>
+        <a:font script="Viet" typeface="Arial"/>
+        <a:font script="Uigh" typeface="Microsoft Uighur"/>
+        <a:font script="Geor" typeface="Sylfaen"/>
+      </a:minorFont>
+    </a:fontScheme>
+    <a:fmtScheme name="Office">
+      <a:fillStyleLst>
+        <a:solidFill>
+          <a:schemeClr val="phClr"/>
+        </a:solidFill>
+        <a:gradFill rotWithShape="1">
+          <a:gsLst>
+            <a:gs pos="0">
+              <a:schemeClr val="phClr">
+                <a:lumMod val="110000"/>
+                <a:satMod val="105000"/>
+                <a:tint val="67000"/>
+              </a:schemeClr>
+            </a:gs>
+            <a:gs pos="50000">
+              <a:schemeClr val="phClr">
+                <a:lumMod val="105000"/>
+                <a:satMod val="103000"/>
+                <a:tint val="73000"/>
+              </a:schemeClr>
+            </a:gs>
+            <a:gs pos="100000">
+              <a:schemeClr val="phClr">
+                <a:lumMod val="105000"/>
+                <a:satMod val="109000"/>
+                <a:tint val="81000"/>
+              </a:schemeClr>
+            </a:gs>
+          </a:gsLst>
+          <a:lin ang="5400000" scaled="0"/>
+        </a:gradFill>
+        <a:gradFill rotWithShape="1">
+          <a:gsLst>
+            <a:gs pos="0">
+              <a:schemeClr val="phClr">
+                <a:satMod val="103000"/>
+                <a:lumMod val="102000"/>
+                <a:tint val="94000"/>
+              </a:schemeClr>
+            </a:gs>
+            <a:gs pos="50000">
+              <a:schemeClr val="phClr">
+                <a:satMod val="110000"/>
+                <a:lumMod val="100000"/>
+                <a:shade val="100000"/>
+              </a:schemeClr>
+            </a:gs>
+            <a:gs pos="100000">
+              <a:schemeClr val="phClr">
+                <a:lumMod val="99000"/>
+                <a:satMod val="120000"/>
+                <a:shade val="78000"/>
+              </a:schemeClr>
+            </a:gs>
+          </a:gsLst>
+          <a:lin ang="5400000" scaled="0"/>
+        </a:gradFill>
+      </a:fillStyleLst>
+      <a:lnStyleLst>
+        <a:ln w="6350" cap="flat" cmpd="sng" algn="ctr">
+          <a:solidFill>
+            <a:schemeClr val="phClr"/>
+          </a:solidFill>
+          <a:prstDash val="solid"/>
+          <a:miter lim="800000"/>
+        </a:ln>
+        <a:ln w="12700" cap="flat" cmpd="sng" algn="ctr">
+          <a:solidFill>
+            <a:schemeClr val="phClr"/>
+          </a:solidFill>
+          <a:prstDash val="solid"/>
+          <a:miter lim="800000"/>
+        </a:ln>
+        <a:ln w="19050" cap="flat" cmpd="sng" algn="ctr">
+          <a:solidFill>
+            <a:schemeClr val="phClr"/>
+          </a:solidFill>
+          <a:prstDash val="solid"/>
+          <a:miter lim="800000"/>
+        </a:ln>
+      </a:lnStyleLst>
+      <a:effectStyleLst>
+        <a:effectStyle>
+          <a:effectLst/>
+        </a:effectStyle>
+        <a:effectStyle>
+          <a:effectLst/>
+        </a:effectStyle>
+        <a:effectStyle>
+          <a:effectLst>
+            <a:outerShdw blurRad="57150" dist="19050" dir="5400000" algn="ctr" rotWithShape="0">
+              <a:srgbClr val="000000">
+                <a:alpha val="63000"/>
+              </a:srgbClr>
+            </a:outerShdw>
+          </a:effectLst>
+        </a:effectStyle>
+      </a:effectStyleLst>
+      <a:bgFillStyleLst>
+        <a:solidFill>
+          <a:schemeClr val="phClr"/>
+        </a:solidFill>
+        <a:solidFill>
+          <a:schemeClr val="phClr">
+            <a:tint val="95000"/>
+            <a:satMod val="170000"/>
+          </a:schemeClr>
+        </a:solidFill>
+        <a:gradFill rotWithShape="1">
+          <a:gsLst>
+            <a:gs pos="0">
+              <a:schemeClr val="phClr">
+                <a:tint val="93000"/>
+                <a:satMod val="150000"/>
+                <a:shade val="98000"/>
+                <a:lumMod val="102000"/>
+              </a:schemeClr>
+            </a:gs>
+            <a:gs pos="50000">
+              <a:schemeClr val="phClr">
+                <a:tint val="98000"/>
+                <a:satMod val="130000"/>
+                <a:shade val="90000"/>
+                <a:lumMod val="103000"/>
+              </a:schemeClr>
+            </a:gs>
+            <a:gs pos="100000">
+              <a:schemeClr val="phClr">
+                <a:shade val="63000"/>
+                <a:satMod val="120000"/>
+              </a:schemeClr>
+            </a:gs>
+          </a:gsLst>
+          <a:lin ang="5400000" scaled="0"/>
+        </a:gradFill>
+      </a:bgFillStyleLst>
+    </a:fmtScheme>
+  </a:themeElements>
+  <a:objectDefaults/>
+  <a:extraClrSchemeLst/>
+  <a:extLst>
+    <a:ext uri="{05A4C25C-085E-4340-85A3-A5531E510DB2}">
+      <thm15:themeFamily xmlns:thm15="http://schemas.microsoft.com/office/thememl/2012/main" name="Office Theme" id="{62F939B6-93AF-4DB8-9C6B-D6C7DFDC589F}" vid="{4A3C46E8-61CC-4603-A589-7422A47A8E4A}"/>
     </a:ext>
   </a:extLst>
 </a:theme>

</xml_diff>